<commit_message>
New files for crash course on data science
</commit_message>
<xml_diff>
--- a/2024-inrae-model-data-researcher-school/intro-to-machine-learning-models-tonda.pptx
+++ b/2024-inrae-model-data-researcher-school/intro-to-machine-learning-models-tonda.pptx
@@ -2662,8 +2662,8 @@
           <a:lstStyle/>
           <a:p>
             <a:r>
-              <a:rPr lang="it-IT" sz="9600" dirty="0"/>
-              <a:t>Classification and AI models</a:t>
+              <a:rPr lang="it-IT" sz="9600"/>
+              <a:t>Machine learning</a:t>
             </a:r>
             <a:endParaRPr lang="fr-FR" sz="9600" dirty="0"/>
           </a:p>

</xml_diff>